<commit_message>
Deploying to gh-pages from @ ManuelePasini/slides-markdown@ccfdf413138db4b6c0e606e623e07e1bf0f18b0b 🚀
</commit_message>
<xml_diff>
--- a/ioanninaSlides.pptx
+++ b/ioanninaSlides.pptx
@@ -3215,14 +3215,32 @@
             <a:pPr lvl="1"/>
             <a:r>
               <a:rPr/>
-              <a:t>Data architectures and methodologies for Digital Twins (oh god not DTs again) Oh God no, not DTs again</a:t>
+              <a:t>Data architectures and methodologies for Digital Twins (oh god not DTs again)</a:t>
+            </a:r>
+          </a:p>
+          <a:p>
+            <a:pPr lvl="1" indent="0" marL="342900">
+              <a:buNone/>
+            </a:pPr>
+            <a:r>
+              <a:rPr/>
+              <a:t>Oh God no, not DTs again</a:t>
+            </a:r>
+          </a:p>
+          <a:p>
+            <a:pPr lvl="1" indent="0" marL="342900">
+              <a:buNone/>
+            </a:pPr>
+            <a:r>
+              <a:rPr/>
+              <a:t>Oh God no, not DTs again</a:t>
             </a:r>
           </a:p>
           <a:p>
             <a:pPr lvl="1"/>
             <a:r>
               <a:rPr/>
-              <a:t>Precision Agriculture</a:t>
+              <a:t>Precision Agriculture (static &amp; dynamic entities)</a:t>
             </a:r>
           </a:p>
         </p:txBody>

</xml_diff>

<commit_message>
Deploying to gh-pages from @ ManuelePasini/slides-markdown@5f0e740a4d9a96065d5d910a9f108f41eb669ded 🚀
</commit_message>
<xml_diff>
--- a/ioanninaSlides.pptx
+++ b/ioanninaSlides.pptx
@@ -3213,6 +3213,13 @@
           </a:p>
           <a:p>
             <a:pPr lvl="1"/>
+            <a:r>
+              <a:rPr/>
+              <a:t>Big Data, Data Platforms, Data Engineering</a:t>
+            </a:r>
+          </a:p>
+          <a:p>
+            <a:pPr lvl="2"/>
             <a:r>
               <a:rPr/>
               <a:t>Data architectures and methodologies for Digital Twins (oh god not DTs again)</a:t>

</xml_diff>

<commit_message>
Deploying to gh-pages from @ ManuelePasini/slides-markdown@6e7ecb6c557e0195068f38d97ceebe5b931faa1f 🚀
</commit_message>
<xml_diff>
--- a/ioanninaSlides.pptx
+++ b/ioanninaSlides.pptx
@@ -6,6 +6,7 @@
   </p:sldMasterIdLst>
   <p:sldIdLst>
     <p:sldId id="256" r:id="rId2"/>
+    <p:sldId id="257" r:id="rId3"/>
   </p:sldIdLst>
   <p:sldSz cx="9144000" cy="5143500" type="screen16x9"/>
   <p:notesSz cx="6858000" cy="9144000"/>
@@ -3211,43 +3212,124 @@
               <a:t>Area of Interest:</a:t>
             </a:r>
           </a:p>
-          <a:p>
-            <a:pPr lvl="1"/>
+        </p:txBody>
+      </p:sp>
+    </p:spTree>
+  </p:cSld>
+</p:sld>
+</file>
+
+<file path=ppt/slides/slide2.xml><?xml version="1.0" encoding="utf-8"?>
+<p:sld xmlns:a="http://schemas.openxmlformats.org/drawingml/2006/main" xmlns:r="http://schemas.openxmlformats.org/officeDocument/2006/relationships" xmlns:p="http://schemas.openxmlformats.org/presentationml/2006/main">
+  <p:cSld>
+    <p:spTree>
+      <p:nvGrpSpPr>
+        <p:cNvPr id="1" name=""/>
+        <p:cNvGrpSpPr/>
+        <p:nvPr/>
+      </p:nvGrpSpPr>
+      <p:grpSpPr>
+        <a:xfrm>
+          <a:off x="0" y="0"/>
+          <a:ext cx="0" cy="0"/>
+          <a:chOff x="0" y="0"/>
+          <a:chExt cx="0" cy="0"/>
+        </a:xfrm>
+      </p:grpSpPr>
+      <p:sp>
+        <p:nvSpPr>
+          <p:cNvPr id="3" name="Content Placeholder 2"/>
+          <p:cNvSpPr>
+            <a:spLocks noGrp="1"/>
+          </p:cNvSpPr>
+          <p:nvPr>
+            <p:ph idx="1" sz="half"/>
+          </p:nvPr>
+        </p:nvSpPr>
+        <p:spPr/>
+        <p:txBody>
+          <a:bodyPr/>
+          <a:lstStyle/>
+          <a:p>
+            <a:pPr lvl="0"/>
             <a:r>
               <a:rPr/>
               <a:t>Big Data, Data Platforms, Data Engineering</a:t>
             </a:r>
           </a:p>
           <a:p>
-            <a:pPr lvl="2"/>
+            <a:pPr lvl="1"/>
             <a:r>
               <a:rPr/>
               <a:t>Data architectures and methodologies for Digital Twins (oh god not DTs again)</a:t>
             </a:r>
           </a:p>
           <a:p>
-            <a:pPr lvl="1" indent="0" marL="342900">
+            <a:pPr lvl="0"/>
+            <a:r>
+              <a:rPr/>
+              <a:t>Precision Agriculture (static &amp; dynamic entities)</a:t>
+            </a:r>
+            <a:br/>
+          </a:p>
+        </p:txBody>
+      </p:sp>
+      <p:pic>
+        <p:nvPicPr>
+          <p:cNvPr descr="https://raw.githubusercontent.com/ManuelePasini/slides-markdown/refs/heads/master/slides/images/ioanninaSlides/dt_meme.jpg" id="0" name="Picture 1"/>
+          <p:cNvPicPr>
+            <a:picLocks noGrp="1" noChangeAspect="1"/>
+          </p:cNvPicPr>
+          <p:nvPr/>
+        </p:nvPicPr>
+        <p:blipFill>
+          <a:blip r:embed="rId2"/>
+          <a:stretch>
+            <a:fillRect/>
+          </a:stretch>
+        </p:blipFill>
+        <p:spPr bwMode="auto">
+          <a:xfrm>
+            <a:off x="5372100" y="1193800"/>
+            <a:ext cx="2590800" cy="2882900"/>
+          </a:xfrm>
+          <a:prstGeom prst="rect">
+            <a:avLst/>
+          </a:prstGeom>
+          <a:noFill/>
+          <a:ln w="9525">
+            <a:noFill/>
+            <a:headEnd/>
+            <a:tailEnd/>
+          </a:ln>
+        </p:spPr>
+      </p:pic>
+      <p:sp>
+        <p:nvSpPr>
+          <p:cNvPr id="1" name="TextBox 3"/>
+          <p:cNvSpPr txBox="1"/>
+          <p:nvPr/>
+        </p:nvSpPr>
+        <p:spPr>
+          <a:xfrm>
+            <a:off x="4648200" y="4076700"/>
+            <a:ext cx="4038600" cy="508000"/>
+          </a:xfrm>
+          <a:prstGeom prst="rect">
+            <a:avLst/>
+          </a:prstGeom>
+          <a:noFill/>
+        </p:spPr>
+        <p:txBody>
+          <a:bodyPr/>
+          <a:lstStyle/>
+          <a:p>
+            <a:pPr lvl="0" indent="0" marL="0" algn="ctr">
               <a:buNone/>
             </a:pPr>
             <a:r>
               <a:rPr/>
               <a:t>Oh God no, not DTs again</a:t>
-            </a:r>
-          </a:p>
-          <a:p>
-            <a:pPr lvl="1" indent="0" marL="342900">
-              <a:buNone/>
-            </a:pPr>
-            <a:r>
-              <a:rPr/>
-              <a:t>Oh God no, not DTs again</a:t>
-            </a:r>
-          </a:p>
-          <a:p>
-            <a:pPr lvl="1"/>
-            <a:r>
-              <a:rPr/>
-              <a:t>Precision Agriculture (static &amp; dynamic entities)</a:t>
             </a:r>
           </a:p>
         </p:txBody>

</xml_diff>

<commit_message>
Deploying to gh-pages from @ ManuelePasini/slides-markdown@e8c20a54145499084e66508ca6470f9dd3227cac 🚀
</commit_message>
<xml_diff>
--- a/ioanninaSlides.pptx
+++ b/ioanninaSlides.pptx
@@ -6,7 +6,6 @@
   </p:sldMasterIdLst>
   <p:sldIdLst>
     <p:sldId id="256" r:id="rId2"/>
-    <p:sldId id="257" r:id="rId3"/>
   </p:sldIdLst>
   <p:sldSz cx="9144000" cy="5143500" type="screen16x9"/>
   <p:notesSz cx="6858000" cy="9144000"/>
@@ -3171,7 +3170,7 @@
             <a:spLocks noGrp="1"/>
           </p:cNvSpPr>
           <p:nvPr>
-            <p:ph idx="1"/>
+            <p:ph idx="1" sz="half"/>
           </p:nvPr>
         </p:nvSpPr>
         <p:spPr/>
@@ -3212,44 +3211,6 @@
               <a:t>Area of Interest:</a:t>
             </a:r>
           </a:p>
-        </p:txBody>
-      </p:sp>
-    </p:spTree>
-  </p:cSld>
-</p:sld>
-</file>
-
-<file path=ppt/slides/slide2.xml><?xml version="1.0" encoding="utf-8"?>
-<p:sld xmlns:a="http://schemas.openxmlformats.org/drawingml/2006/main" xmlns:r="http://schemas.openxmlformats.org/officeDocument/2006/relationships" xmlns:p="http://schemas.openxmlformats.org/presentationml/2006/main">
-  <p:cSld>
-    <p:spTree>
-      <p:nvGrpSpPr>
-        <p:cNvPr id="1" name=""/>
-        <p:cNvGrpSpPr/>
-        <p:nvPr/>
-      </p:nvGrpSpPr>
-      <p:grpSpPr>
-        <a:xfrm>
-          <a:off x="0" y="0"/>
-          <a:ext cx="0" cy="0"/>
-          <a:chOff x="0" y="0"/>
-          <a:chExt cx="0" cy="0"/>
-        </a:xfrm>
-      </p:grpSpPr>
-      <p:sp>
-        <p:nvSpPr>
-          <p:cNvPr id="3" name="Content Placeholder 2"/>
-          <p:cNvSpPr>
-            <a:spLocks noGrp="1"/>
-          </p:cNvSpPr>
-          <p:nvPr>
-            <p:ph idx="1" sz="half"/>
-          </p:nvPr>
-        </p:nvSpPr>
-        <p:spPr/>
-        <p:txBody>
-          <a:bodyPr/>
-          <a:lstStyle/>
           <a:p>
             <a:pPr lvl="0"/>
             <a:r>
@@ -3270,61 +3231,34 @@
               <a:rPr/>
               <a:t>Precision Agriculture (static &amp; dynamic entities)</a:t>
             </a:r>
-            <a:br/>
-          </a:p>
-        </p:txBody>
-      </p:sp>
-      <p:pic>
-        <p:nvPicPr>
-          <p:cNvPr descr="https://raw.githubusercontent.com/ManuelePasini/slides-markdown/refs/heads/master/slides/images/ioanninaSlides/dt_meme.jpg" id="0" name="Picture 1"/>
-          <p:cNvPicPr>
-            <a:picLocks noGrp="1" noChangeAspect="1"/>
-          </p:cNvPicPr>
-          <p:nvPr/>
-        </p:nvPicPr>
-        <p:blipFill>
-          <a:blip r:embed="rId2"/>
-          <a:stretch>
-            <a:fillRect/>
-          </a:stretch>
-        </p:blipFill>
-        <p:spPr bwMode="auto">
-          <a:xfrm>
-            <a:off x="5372100" y="1193800"/>
-            <a:ext cx="2590800" cy="2882900"/>
-          </a:xfrm>
-          <a:prstGeom prst="rect">
-            <a:avLst/>
-          </a:prstGeom>
-          <a:noFill/>
-          <a:ln w="9525">
-            <a:noFill/>
-            <a:headEnd/>
-            <a:tailEnd/>
-          </a:ln>
-        </p:spPr>
-      </p:pic>
-      <p:sp>
-        <p:nvSpPr>
-          <p:cNvPr id="1" name="TextBox 3"/>
-          <p:cNvSpPr txBox="1"/>
-          <p:nvPr/>
-        </p:nvSpPr>
-        <p:spPr>
-          <a:xfrm>
-            <a:off x="4648200" y="4076700"/>
-            <a:ext cx="4038600" cy="508000"/>
-          </a:xfrm>
-          <a:prstGeom prst="rect">
-            <a:avLst/>
-          </a:prstGeom>
-          <a:noFill/>
-        </p:spPr>
-        <p:txBody>
-          <a:bodyPr/>
-          <a:lstStyle/>
-          <a:p>
-            <a:pPr lvl="0" indent="0" marL="0" algn="ctr">
+          </a:p>
+        </p:txBody>
+      </p:sp>
+      <p:sp>
+        <p:nvSpPr>
+          <p:cNvPr id="4" name="Content Placeholder 3"/>
+          <p:cNvSpPr>
+            <a:spLocks noGrp="1"/>
+          </p:cNvSpPr>
+          <p:nvPr>
+            <p:ph idx="2" sz="half"/>
+          </p:nvPr>
+        </p:nvSpPr>
+        <p:spPr/>
+        <p:txBody>
+          <a:bodyPr/>
+          <a:lstStyle/>
+          <a:p>
+            <a:pPr lvl="0" indent="0" marL="0">
+              <a:buNone/>
+            </a:pPr>
+            <a:r>
+              <a:rPr/>
+              <a:t>Oh God no, not DTs again</a:t>
+            </a:r>
+          </a:p>
+          <a:p>
+            <a:pPr lvl="0" indent="0" marL="0">
               <a:buNone/>
             </a:pPr>
             <a:r>

</xml_diff>

<commit_message>
Deploying to gh-pages from @ ManuelePasini/slides-markdown@6f8d669d438d3042e7bf79ad50449ffa1a4a2739 🚀
</commit_message>
<xml_diff>
--- a/ioanninaSlides.pptx
+++ b/ioanninaSlides.pptx
@@ -6,6 +6,7 @@
   </p:sldMasterIdLst>
   <p:sldIdLst>
     <p:sldId id="256" r:id="rId2"/>
+    <p:sldId id="257" r:id="rId3"/>
   </p:sldIdLst>
   <p:sldSz cx="9144000" cy="5143500" type="screen16x9"/>
   <p:notesSz cx="6858000" cy="9144000"/>
@@ -3229,7 +3230,7 @@
             <a:pPr lvl="0"/>
             <a:r>
               <a:rPr/>
-              <a:t>Precision Agriculture (static &amp; dynamic entities)</a:t>
+              <a:t>Precision Agriculture</a:t>
             </a:r>
           </a:p>
         </p:txBody>
@@ -3264,6 +3265,162 @@
             <a:r>
               <a:rPr/>
               <a:t>Oh God no, not DTs again</a:t>
+            </a:r>
+          </a:p>
+        </p:txBody>
+      </p:sp>
+    </p:spTree>
+  </p:cSld>
+</p:sld>
+</file>
+
+<file path=ppt/slides/slide2.xml><?xml version="1.0" encoding="utf-8"?>
+<p:sld xmlns:a="http://schemas.openxmlformats.org/drawingml/2006/main" xmlns:r="http://schemas.openxmlformats.org/officeDocument/2006/relationships" xmlns:p="http://schemas.openxmlformats.org/presentationml/2006/main">
+  <p:cSld>
+    <p:spTree>
+      <p:nvGrpSpPr>
+        <p:cNvPr id="1" name=""/>
+        <p:cNvGrpSpPr/>
+        <p:nvPr/>
+      </p:nvGrpSpPr>
+      <p:grpSpPr>
+        <a:xfrm>
+          <a:off x="0" y="0"/>
+          <a:ext cx="0" cy="0"/>
+          <a:chOff x="0" y="0"/>
+          <a:chExt cx="0" cy="0"/>
+        </a:xfrm>
+      </p:grpSpPr>
+      <p:sp>
+        <p:nvSpPr>
+          <p:cNvPr id="2" name="Title 1"/>
+          <p:cNvSpPr>
+            <a:spLocks noGrp="1"/>
+          </p:cNvSpPr>
+          <p:nvPr>
+            <p:ph type="title"/>
+          </p:nvPr>
+        </p:nvSpPr>
+        <p:spPr/>
+        <p:txBody>
+          <a:bodyPr/>
+          <a:lstStyle/>
+          <a:p>
+            <a:pPr lvl="0" indent="0" marL="0">
+              <a:buNone/>
+            </a:pPr>
+            <a:r>
+              <a:rPr/>
+              <a:t>Current Work</a:t>
+            </a:r>
+          </a:p>
+        </p:txBody>
+      </p:sp>
+      <p:pic>
+        <p:nvPicPr>
+          <p:cNvPr descr="https://raw.githubusercontent.com/ManuelePasini/slides-markdown/refs/heads/master/slides/images/ioanninaSlides/dt_graph.svg" id="0" name="Picture 1"/>
+          <p:cNvPicPr>
+            <a:picLocks noGrp="1" noChangeAspect="1"/>
+          </p:cNvPicPr>
+          <p:nvPr/>
+        </p:nvPicPr>
+        <p:blipFill>
+          <a:blip r:embed="rId2"/>
+          <a:stretch>
+            <a:fillRect/>
+          </a:stretch>
+        </p:blipFill>
+        <p:spPr bwMode="auto">
+          <a:xfrm>
+            <a:off x="2413000" y="1193800"/>
+            <a:ext cx="4318000" cy="2882900"/>
+          </a:xfrm>
+          <a:prstGeom prst="rect">
+            <a:avLst/>
+          </a:prstGeom>
+          <a:noFill/>
+          <a:ln w="9525">
+            <a:noFill/>
+            <a:headEnd/>
+            <a:tailEnd/>
+          </a:ln>
+        </p:spPr>
+      </p:pic>
+      <p:sp>
+        <p:nvSpPr>
+          <p:cNvPr id="1" name="TextBox 3"/>
+          <p:cNvSpPr txBox="1"/>
+          <p:nvPr/>
+        </p:nvSpPr>
+        <p:spPr>
+          <a:xfrm>
+            <a:off x="457200" y="4076700"/>
+            <a:ext cx="8229600" cy="508000"/>
+          </a:xfrm>
+          <a:prstGeom prst="rect">
+            <a:avLst/>
+          </a:prstGeom>
+          <a:noFill/>
+        </p:spPr>
+        <p:txBody>
+          <a:bodyPr/>
+          <a:lstStyle/>
+          <a:p>
+            <a:pPr lvl="0" indent="0" marL="0" algn="ctr">
+              <a:buNone/>
+            </a:pPr>
+            <a:r>
+              <a:rPr/>
+              <a:t>Hybrid data model</a:t>
+            </a:r>
+          </a:p>
+        </p:txBody>
+      </p:sp>
+      <p:sp>
+        <p:nvSpPr>
+          <p:cNvPr id="3" name="Content Placeholder 2"/>
+          <p:cNvSpPr>
+            <a:spLocks noGrp="1"/>
+          </p:cNvSpPr>
+          <p:nvPr>
+            <p:ph idx="1"/>
+          </p:nvPr>
+        </p:nvSpPr>
+        <p:spPr/>
+        <p:txBody>
+          <a:bodyPr/>
+          <a:lstStyle/>
+          <a:p>
+            <a:pPr lvl="0" indent="0" marL="0">
+              <a:spcBef>
+                <a:spcPts val="3000"/>
+              </a:spcBef>
+              <a:buNone/>
+            </a:pPr>
+            <a:r>
+              <a:rPr b="1"/>
+              <a:t>Future plans</a:t>
+            </a:r>
+          </a:p>
+          <a:p>
+            <a:pPr lvl="0"/>
+            <a:r>
+              <a:rPr/>
+              <a:t>Actually manage to finish and publish the paper;</a:t>
+            </a:r>
+          </a:p>
+          <a:p>
+            <a:pPr lvl="0"/>
+            <a:r>
+              <a:rPr/>
+              <a:t>Work on optimizing the data structure;</a:t>
+            </a:r>
+          </a:p>
+          <a:p>
+            <a:pPr lvl="0"/>
+            <a:r>
+              <a:rPr/>
+              <a:t>Survive this journey without going insane.</a:t>
             </a:r>
           </a:p>
         </p:txBody>

</xml_diff>

<commit_message>
Deploying to gh-pages from @ ManuelePasini/slides-markdown@8059f264e01b8f8c24e9b31d0e74d18d982c2a4f 🚀
</commit_message>
<xml_diff>
--- a/ioanninaSlides.pptx
+++ b/ioanninaSlides.pptx
@@ -7,6 +7,7 @@
   <p:sldIdLst>
     <p:sldId id="256" r:id="rId2"/>
     <p:sldId id="257" r:id="rId3"/>
+    <p:sldId id="258" r:id="rId4"/>
   </p:sldIdLst>
   <p:sldSz cx="9144000" cy="5143500" type="screen16x9"/>
   <p:notesSz cx="6858000" cy="9144000"/>
@@ -3216,21 +3217,35 @@
             <a:pPr lvl="0"/>
             <a:r>
               <a:rPr/>
-              <a:t>Big Data, Data Platforms, Data Engineering</a:t>
+              <a:t>Big Data and Data Platforms:</a:t>
             </a:r>
           </a:p>
           <a:p>
             <a:pPr lvl="1"/>
             <a:r>
               <a:rPr/>
-              <a:t>Data architectures and methodologies for Digital Twins (oh god not DTs again)</a:t>
+              <a:t>from collection to exploitation;</a:t>
             </a:r>
           </a:p>
           <a:p>
             <a:pPr lvl="0"/>
             <a:r>
               <a:rPr/>
-              <a:t>Precision Agriculture</a:t>
+              <a:t>Data architectures and methodologies for Digital Twins</a:t>
+            </a:r>
+          </a:p>
+          <a:p>
+            <a:pPr lvl="0"/>
+            <a:r>
+              <a:rPr/>
+              <a:t>Precision Agriculture:</a:t>
+            </a:r>
+          </a:p>
+          <a:p>
+            <a:pPr lvl="1"/>
+            <a:r>
+              <a:rPr/>
+              <a:t>Irrigation optimization</a:t>
             </a:r>
           </a:p>
         </p:txBody>
@@ -3318,7 +3333,7 @@
       </p:sp>
       <p:pic>
         <p:nvPicPr>
-          <p:cNvPr descr="https://raw.githubusercontent.com/ManuelePasini/slides-markdown/refs/heads/master/slides/images/ioanninaSlides/dt_graph.svg" id="0" name="Picture 1"/>
+          <p:cNvPr descr="https://raw.githubusercontent.com/ManuelePasini/slides-markdown/refs/heads/master/slides/images/ioanninaSlides/catalog.jpg" id="0" name="Picture 1"/>
           <p:cNvPicPr>
             <a:picLocks noGrp="1" noChangeAspect="1"/>
           </p:cNvPicPr>
@@ -3332,8 +3347,8 @@
         </p:blipFill>
         <p:spPr bwMode="auto">
           <a:xfrm>
-            <a:off x="2413000" y="1193800"/>
-            <a:ext cx="4318000" cy="2882900"/>
+            <a:off x="457200" y="1943100"/>
+            <a:ext cx="4038600" cy="1397000"/>
           </a:xfrm>
           <a:prstGeom prst="rect">
             <a:avLst/>
@@ -3355,7 +3370,7 @@
         <p:spPr>
           <a:xfrm>
             <a:off x="457200" y="4076700"/>
-            <a:ext cx="8229600" cy="508000"/>
+            <a:ext cx="4038600" cy="508000"/>
           </a:xfrm>
           <a:prstGeom prst="rect">
             <a:avLst/>
@@ -3371,11 +3386,67 @@
             </a:pPr>
             <a:r>
               <a:rPr/>
+              <a:t>Excerpt of our P.A. platform</a:t>
+            </a:r>
+          </a:p>
+        </p:txBody>
+      </p:sp>
+      <p:sp>
+        <p:nvSpPr>
+          <p:cNvPr id="4" name="Content Placeholder 3"/>
+          <p:cNvSpPr>
+            <a:spLocks noGrp="1"/>
+          </p:cNvSpPr>
+          <p:nvPr>
+            <p:ph idx="2" sz="half"/>
+          </p:nvPr>
+        </p:nvSpPr>
+        <p:spPr/>
+        <p:txBody>
+          <a:bodyPr/>
+          <a:lstStyle/>
+          <a:p>
+            <a:pPr lvl="0" indent="0" marL="0">
+              <a:buNone/>
+            </a:pPr>
+            <a:r>
+              <a:rPr/>
               <a:t>Hybrid data model</a:t>
             </a:r>
           </a:p>
-        </p:txBody>
-      </p:sp>
+          <a:p>
+            <a:pPr lvl="0" indent="0" marL="0">
+              <a:buNone/>
+            </a:pPr>
+            <a:r>
+              <a:rPr/>
+              <a:t>Hybrid data model</a:t>
+            </a:r>
+          </a:p>
+        </p:txBody>
+      </p:sp>
+    </p:spTree>
+  </p:cSld>
+</p:sld>
+</file>
+
+<file path=ppt/slides/slide3.xml><?xml version="1.0" encoding="utf-8"?>
+<p:sld xmlns:a="http://schemas.openxmlformats.org/drawingml/2006/main" xmlns:r="http://schemas.openxmlformats.org/officeDocument/2006/relationships" xmlns:p="http://schemas.openxmlformats.org/presentationml/2006/main">
+  <p:cSld>
+    <p:spTree>
+      <p:nvGrpSpPr>
+        <p:cNvPr id="1" name=""/>
+        <p:cNvGrpSpPr/>
+        <p:nvPr/>
+      </p:nvGrpSpPr>
+      <p:grpSpPr>
+        <a:xfrm>
+          <a:off x="0" y="0"/>
+          <a:ext cx="0" cy="0"/>
+          <a:chOff x="0" y="0"/>
+          <a:chExt cx="0" cy="0"/>
+        </a:xfrm>
+      </p:grpSpPr>
       <p:sp>
         <p:nvSpPr>
           <p:cNvPr id="3" name="Content Placeholder 2"/>
@@ -3413,14 +3484,32 @@
             <a:pPr lvl="0"/>
             <a:r>
               <a:rPr/>
-              <a:t>Work on optimizing the data structure;</a:t>
+              <a:t>optimizing the data structure;</a:t>
             </a:r>
           </a:p>
           <a:p>
             <a:pPr lvl="0"/>
             <a:r>
               <a:rPr/>
-              <a:t>Survive this journey without going insane.</a:t>
+              <a:t>Wor :::{.fragment}</a:t>
+            </a:r>
+          </a:p>
+          <a:p>
+            <a:pPr lvl="0" indent="0" marL="0">
+              <a:buNone/>
+            </a:pPr>
+            <a:r>
+              <a:rPr b="1"/>
+              <a:t>Survive this journey without going insane</a:t>
+            </a:r>
+          </a:p>
+          <a:p>
+            <a:pPr lvl="0" indent="0" marL="0">
+              <a:buNone/>
+            </a:pPr>
+            <a:r>
+              <a:rPr/>
+              <a:t>:::</a:t>
             </a:r>
           </a:p>
         </p:txBody>

</xml_diff>

<commit_message>
Deploying to gh-pages from @ ManuelePasini/slides-markdown@4bd72b8979743c662299f88328f5481965c3c43a 🚀
</commit_message>
<xml_diff>
--- a/ioanninaSlides.pptx
+++ b/ioanninaSlides.pptx
@@ -3347,8 +3347,8 @@
         </p:blipFill>
         <p:spPr bwMode="auto">
           <a:xfrm>
-            <a:off x="457200" y="1943100"/>
-            <a:ext cx="4038600" cy="1397000"/>
+            <a:off x="457200" y="1485900"/>
+            <a:ext cx="4038600" cy="2298700"/>
           </a:xfrm>
           <a:prstGeom prst="rect">
             <a:avLst/>
@@ -3491,7 +3491,7 @@
             <a:pPr lvl="0"/>
             <a:r>
               <a:rPr/>
-              <a:t>Wor :::{.fragment}</a:t>
+              <a:t>Wor</a:t>
             </a:r>
           </a:p>
           <a:p>
@@ -3501,15 +3501,6 @@
             <a:r>
               <a:rPr b="1"/>
               <a:t>Survive this journey without going insane</a:t>
-            </a:r>
-          </a:p>
-          <a:p>
-            <a:pPr lvl="0" indent="0" marL="0">
-              <a:buNone/>
-            </a:pPr>
-            <a:r>
-              <a:rPr/>
-              <a:t>:::</a:t>
             </a:r>
           </a:p>
         </p:txBody>

</xml_diff>

<commit_message>
Deploying to gh-pages from @ ManuelePasini/slides-markdown@52e5503cb6840f93613166761478bf99692c33c6 🚀
</commit_message>
<xml_diff>
--- a/ioanninaSlides.pptx
+++ b/ioanninaSlides.pptx
@@ -3248,6 +3248,19 @@
               <a:t>Irrigation optimization</a:t>
             </a:r>
           </a:p>
+          <a:p>
+            <a:pPr lvl="1"/>
+            <a:r>
+              <a:rPr/>
+              <a:t>Data Platform for italian agriculture domain @</a:t>
+            </a:r>
+            <a:r>
+              <a:rPr>
+                <a:hlinkClick r:id="rId3"/>
+              </a:rPr>
+              <a:t>Agritech</a:t>
+            </a:r>
+          </a:p>
         </p:txBody>
       </p:sp>
       <p:sp>
@@ -3495,9 +3508,7 @@
             </a:r>
           </a:p>
           <a:p>
-            <a:pPr lvl="0" indent="0" marL="0">
-              <a:buNone/>
-            </a:pPr>
+            <a:pPr lvl="0"/>
             <a:r>
               <a:rPr b="1"/>
               <a:t>Survive this journey without going insane</a:t>

</xml_diff>

<commit_message>
Deploying to gh-pages from @ ManuelePasini/slides-markdown@0fc332214abffc1fb7b61187b08e23a444738621 🚀
</commit_message>
<xml_diff>
--- a/ioanninaSlides.pptx
+++ b/ioanninaSlides.pptx
@@ -3424,7 +3424,7 @@
             </a:pPr>
             <a:r>
               <a:rPr/>
-              <a:t>Hybrid data model</a:t>
+              <a:t>Graph+TimeSeries Hybrid data model</a:t>
             </a:r>
           </a:p>
           <a:p>
@@ -3433,7 +3433,7 @@
             </a:pPr>
             <a:r>
               <a:rPr/>
-              <a:t>Hybrid data model</a:t>
+              <a:t>Graph+TimeSeries Hybrid data model</a:t>
             </a:r>
           </a:p>
         </p:txBody>
@@ -3498,13 +3498,6 @@
             <a:r>
               <a:rPr/>
               <a:t>optimizing the data structure;</a:t>
-            </a:r>
-          </a:p>
-          <a:p>
-            <a:pPr lvl="0"/>
-            <a:r>
-              <a:rPr/>
-              <a:t>Wor</a:t>
             </a:r>
           </a:p>
           <a:p>

</xml_diff>

<commit_message>
Deploying to gh-pages from @ ManuelePasini/slides-markdown@3686f3136499b79f62650952e30459b3b3745ff8 🚀
</commit_message>
<xml_diff>
--- a/ioanninaSlides.pptx
+++ b/ioanninaSlides.pptx
@@ -3217,14 +3217,7 @@
             <a:pPr lvl="0"/>
             <a:r>
               <a:rPr/>
-              <a:t>Big Data and Data Platforms:</a:t>
-            </a:r>
-          </a:p>
-          <a:p>
-            <a:pPr lvl="1"/>
-            <a:r>
-              <a:rPr/>
-              <a:t>from collection to exploitation;</a:t>
+              <a:t>Big Data and Data Platforms</a:t>
             </a:r>
           </a:p>
           <a:p>
@@ -3490,14 +3483,14 @@
             <a:pPr lvl="0"/>
             <a:r>
               <a:rPr/>
-              <a:t>Actually manage to finish and publish the paper;</a:t>
+              <a:t>Hopefully finish and publish the paper;</a:t>
             </a:r>
           </a:p>
           <a:p>
             <a:pPr lvl="0"/>
             <a:r>
               <a:rPr/>
-              <a:t>optimizing the data structure;</a:t>
+              <a:t>optimize querying performance on the data structure.</a:t>
             </a:r>
           </a:p>
           <a:p>

</xml_diff>

<commit_message>
Deploying to gh-pages from @ ManuelePasini/slides-markdown@7d59a30bebc10dfe8ea3974d3c9add6737b43f58 🚀
</commit_message>
<xml_diff>
--- a/ioanninaSlides.pptx
+++ b/ioanninaSlides.pptx
@@ -3490,7 +3490,14 @@
             <a:pPr lvl="0"/>
             <a:r>
               <a:rPr/>
-              <a:t>optimize querying performance on the data structure.</a:t>
+              <a:t>optimize querying performances;</a:t>
+            </a:r>
+          </a:p>
+          <a:p>
+            <a:pPr lvl="0"/>
+            <a:r>
+              <a:rPr/>
+              <a:t>enhance query expressiveness;</a:t>
             </a:r>
           </a:p>
           <a:p>

</xml_diff>

<commit_message>
Deploying to gh-pages from @ ManuelePasini/slides-markdown@b8edb093114343d2a1efa78f6f02c0eeee947b0b 🚀
</commit_message>
<xml_diff>
--- a/ioanninaSlides.pptx
+++ b/ioanninaSlides.pptx
@@ -3214,35 +3214,35 @@
             </a:r>
           </a:p>
           <a:p>
-            <a:pPr lvl="0"/>
+            <a:pPr lvl="1"/>
             <a:r>
               <a:rPr/>
               <a:t>Big Data and Data Platforms</a:t>
             </a:r>
           </a:p>
           <a:p>
-            <a:pPr lvl="0"/>
+            <a:pPr lvl="1"/>
             <a:r>
               <a:rPr/>
               <a:t>Data architectures and methodologies for Digital Twins</a:t>
             </a:r>
           </a:p>
           <a:p>
-            <a:pPr lvl="0"/>
+            <a:pPr lvl="1"/>
             <a:r>
               <a:rPr/>
               <a:t>Precision Agriculture:</a:t>
             </a:r>
           </a:p>
           <a:p>
-            <a:pPr lvl="1"/>
+            <a:pPr lvl="2"/>
             <a:r>
               <a:rPr/>
               <a:t>Irrigation optimization</a:t>
             </a:r>
           </a:p>
           <a:p>
-            <a:pPr lvl="1"/>
+            <a:pPr lvl="2"/>
             <a:r>
               <a:rPr/>
               <a:t>Data Platform for italian agriculture domain @</a:t>

</xml_diff>

<commit_message>
Deploying to gh-pages from @ ManuelePasini/slides-markdown@c3254f742e86195ada168cfd75ea6db508802c2d 🚀
</commit_message>
<xml_diff>
--- a/ioanninaSlides.pptx
+++ b/ioanninaSlides.pptx
@@ -3221,28 +3221,28 @@
             </a:r>
           </a:p>
           <a:p>
-            <a:pPr lvl="1"/>
+            <a:pPr lvl="2"/>
             <a:r>
               <a:rPr/>
               <a:t>Data architectures and methodologies for Digital Twins</a:t>
             </a:r>
           </a:p>
           <a:p>
-            <a:pPr lvl="1"/>
+            <a:pPr lvl="2"/>
             <a:r>
               <a:rPr/>
               <a:t>Precision Agriculture:</a:t>
             </a:r>
           </a:p>
           <a:p>
-            <a:pPr lvl="2"/>
+            <a:pPr lvl="3"/>
             <a:r>
               <a:rPr/>
               <a:t>Irrigation optimization</a:t>
             </a:r>
           </a:p>
           <a:p>
-            <a:pPr lvl="2"/>
+            <a:pPr lvl="3"/>
             <a:r>
               <a:rPr/>
               <a:t>Data Platform for italian agriculture domain @</a:t>

</xml_diff>